<commit_message>
messaging page now finished
</commit_message>
<xml_diff>
--- a/High Fidelity Prototyping Group 19.pptx
+++ b/High Fidelity Prototyping Group 19.pptx
@@ -11657,6 +11657,650 @@
           </a:p>
         </p:txBody>
       </p:sp>
+      <p:sp>
+        <p:nvSpPr>
+          <p:cNvPr id="2" name="Rectangle 1">
+            <a:extLst>
+              <a:ext uri="{FF2B5EF4-FFF2-40B4-BE49-F238E27FC236}">
+                <a16:creationId xmlns:a16="http://schemas.microsoft.com/office/drawing/2014/main" id="{E2F02F2F-0461-AB41-B91E-5982F79DEC60}"/>
+              </a:ext>
+            </a:extLst>
+          </p:cNvPr>
+          <p:cNvSpPr/>
+          <p:nvPr/>
+        </p:nvSpPr>
+        <p:spPr>
+          <a:xfrm>
+            <a:off x="484092" y="1780681"/>
+            <a:ext cx="10326399" cy="4584673"/>
+          </a:xfrm>
+          <a:prstGeom prst="rect">
+            <a:avLst/>
+          </a:prstGeom>
+          <a:solidFill>
+            <a:schemeClr val="accent1">
+              <a:lumMod val="20000"/>
+              <a:lumOff val="80000"/>
+            </a:schemeClr>
+          </a:solidFill>
+        </p:spPr>
+        <p:style>
+          <a:lnRef idx="2">
+            <a:schemeClr val="accent1">
+              <a:shade val="50000"/>
+            </a:schemeClr>
+          </a:lnRef>
+          <a:fillRef idx="1">
+            <a:schemeClr val="accent1"/>
+          </a:fillRef>
+          <a:effectRef idx="0">
+            <a:schemeClr val="accent1"/>
+          </a:effectRef>
+          <a:fontRef idx="minor">
+            <a:schemeClr val="lt1"/>
+          </a:fontRef>
+        </p:style>
+        <p:txBody>
+          <a:bodyPr rtlCol="0" anchor="ctr"/>
+          <a:lstStyle/>
+          <a:p>
+            <a:pPr algn="ctr"/>
+            <a:endParaRPr lang="en-US" dirty="0"/>
+          </a:p>
+        </p:txBody>
+      </p:sp>
+      <p:cxnSp>
+        <p:nvCxnSpPr>
+          <p:cNvPr id="4" name="Straight Connector 3">
+            <a:extLst>
+              <a:ext uri="{FF2B5EF4-FFF2-40B4-BE49-F238E27FC236}">
+                <a16:creationId xmlns:a16="http://schemas.microsoft.com/office/drawing/2014/main" id="{0390F5B1-ACFA-704C-B381-C26EC0F3A184}"/>
+              </a:ext>
+            </a:extLst>
+          </p:cNvPr>
+          <p:cNvCxnSpPr>
+            <a:cxnSpLocks/>
+          </p:cNvCxnSpPr>
+          <p:nvPr/>
+        </p:nvCxnSpPr>
+        <p:spPr>
+          <a:xfrm>
+            <a:off x="502022" y="2478505"/>
+            <a:ext cx="10326399" cy="0"/>
+          </a:xfrm>
+          <a:prstGeom prst="line">
+            <a:avLst/>
+          </a:prstGeom>
+        </p:spPr>
+        <p:style>
+          <a:lnRef idx="1">
+            <a:schemeClr val="accent1"/>
+          </a:lnRef>
+          <a:fillRef idx="0">
+            <a:schemeClr val="accent1"/>
+          </a:fillRef>
+          <a:effectRef idx="0">
+            <a:schemeClr val="accent1"/>
+          </a:effectRef>
+          <a:fontRef idx="minor">
+            <a:schemeClr val="tx1"/>
+          </a:fontRef>
+        </p:style>
+      </p:cxnSp>
+      <p:cxnSp>
+        <p:nvCxnSpPr>
+          <p:cNvPr id="19" name="Straight Connector 18">
+            <a:extLst>
+              <a:ext uri="{FF2B5EF4-FFF2-40B4-BE49-F238E27FC236}">
+                <a16:creationId xmlns:a16="http://schemas.microsoft.com/office/drawing/2014/main" id="{2A814C2D-6B2E-AE41-AF16-C545A726108B}"/>
+              </a:ext>
+            </a:extLst>
+          </p:cNvPr>
+          <p:cNvCxnSpPr/>
+          <p:nvPr/>
+        </p:nvCxnSpPr>
+        <p:spPr>
+          <a:xfrm>
+            <a:off x="502022" y="3152274"/>
+            <a:ext cx="10326399" cy="0"/>
+          </a:xfrm>
+          <a:prstGeom prst="line">
+            <a:avLst/>
+          </a:prstGeom>
+        </p:spPr>
+        <p:style>
+          <a:lnRef idx="1">
+            <a:schemeClr val="accent1"/>
+          </a:lnRef>
+          <a:fillRef idx="0">
+            <a:schemeClr val="accent1"/>
+          </a:fillRef>
+          <a:effectRef idx="0">
+            <a:schemeClr val="accent1"/>
+          </a:effectRef>
+          <a:fontRef idx="minor">
+            <a:schemeClr val="tx1"/>
+          </a:fontRef>
+        </p:style>
+      </p:cxnSp>
+      <p:cxnSp>
+        <p:nvCxnSpPr>
+          <p:cNvPr id="23" name="Straight Connector 22">
+            <a:extLst>
+              <a:ext uri="{FF2B5EF4-FFF2-40B4-BE49-F238E27FC236}">
+                <a16:creationId xmlns:a16="http://schemas.microsoft.com/office/drawing/2014/main" id="{115B2645-EB18-6047-B500-E0EEDC203865}"/>
+              </a:ext>
+            </a:extLst>
+          </p:cNvPr>
+          <p:cNvCxnSpPr/>
+          <p:nvPr/>
+        </p:nvCxnSpPr>
+        <p:spPr>
+          <a:xfrm>
+            <a:off x="502022" y="3838074"/>
+            <a:ext cx="10326399" cy="0"/>
+          </a:xfrm>
+          <a:prstGeom prst="line">
+            <a:avLst/>
+          </a:prstGeom>
+        </p:spPr>
+        <p:style>
+          <a:lnRef idx="1">
+            <a:schemeClr val="accent1"/>
+          </a:lnRef>
+          <a:fillRef idx="0">
+            <a:schemeClr val="accent1"/>
+          </a:fillRef>
+          <a:effectRef idx="0">
+            <a:schemeClr val="accent1"/>
+          </a:effectRef>
+          <a:fontRef idx="minor">
+            <a:schemeClr val="tx1"/>
+          </a:fontRef>
+        </p:style>
+      </p:cxnSp>
+      <p:cxnSp>
+        <p:nvCxnSpPr>
+          <p:cNvPr id="26" name="Straight Connector 25">
+            <a:extLst>
+              <a:ext uri="{FF2B5EF4-FFF2-40B4-BE49-F238E27FC236}">
+                <a16:creationId xmlns:a16="http://schemas.microsoft.com/office/drawing/2014/main" id="{140E06D5-7EFF-2940-AC31-DD6568B5E51D}"/>
+              </a:ext>
+            </a:extLst>
+          </p:cNvPr>
+          <p:cNvCxnSpPr/>
+          <p:nvPr/>
+        </p:nvCxnSpPr>
+        <p:spPr>
+          <a:xfrm>
+            <a:off x="502022" y="4518793"/>
+            <a:ext cx="10326399" cy="0"/>
+          </a:xfrm>
+          <a:prstGeom prst="line">
+            <a:avLst/>
+          </a:prstGeom>
+        </p:spPr>
+        <p:style>
+          <a:lnRef idx="1">
+            <a:schemeClr val="accent1"/>
+          </a:lnRef>
+          <a:fillRef idx="0">
+            <a:schemeClr val="accent1"/>
+          </a:fillRef>
+          <a:effectRef idx="0">
+            <a:schemeClr val="accent1"/>
+          </a:effectRef>
+          <a:fontRef idx="minor">
+            <a:schemeClr val="tx1"/>
+          </a:fontRef>
+        </p:style>
+      </p:cxnSp>
+      <p:cxnSp>
+        <p:nvCxnSpPr>
+          <p:cNvPr id="28" name="Straight Connector 27">
+            <a:extLst>
+              <a:ext uri="{FF2B5EF4-FFF2-40B4-BE49-F238E27FC236}">
+                <a16:creationId xmlns:a16="http://schemas.microsoft.com/office/drawing/2014/main" id="{3056ED4B-211E-8A4F-B434-5846ED99A107}"/>
+              </a:ext>
+            </a:extLst>
+          </p:cNvPr>
+          <p:cNvCxnSpPr/>
+          <p:nvPr/>
+        </p:nvCxnSpPr>
+        <p:spPr>
+          <a:xfrm>
+            <a:off x="502022" y="5161547"/>
+            <a:ext cx="10326399" cy="0"/>
+          </a:xfrm>
+          <a:prstGeom prst="line">
+            <a:avLst/>
+          </a:prstGeom>
+        </p:spPr>
+        <p:style>
+          <a:lnRef idx="1">
+            <a:schemeClr val="accent1"/>
+          </a:lnRef>
+          <a:fillRef idx="0">
+            <a:schemeClr val="accent1"/>
+          </a:fillRef>
+          <a:effectRef idx="0">
+            <a:schemeClr val="accent1"/>
+          </a:effectRef>
+          <a:fontRef idx="minor">
+            <a:schemeClr val="tx1"/>
+          </a:fontRef>
+        </p:style>
+      </p:cxnSp>
+      <p:cxnSp>
+        <p:nvCxnSpPr>
+          <p:cNvPr id="30" name="Straight Connector 29">
+            <a:extLst>
+              <a:ext uri="{FF2B5EF4-FFF2-40B4-BE49-F238E27FC236}">
+                <a16:creationId xmlns:a16="http://schemas.microsoft.com/office/drawing/2014/main" id="{C9B68DE0-6C2E-6E43-8A36-03BACE54CDAB}"/>
+              </a:ext>
+            </a:extLst>
+          </p:cNvPr>
+          <p:cNvCxnSpPr/>
+          <p:nvPr/>
+        </p:nvCxnSpPr>
+        <p:spPr>
+          <a:xfrm>
+            <a:off x="502022" y="5868770"/>
+            <a:ext cx="10326399" cy="0"/>
+          </a:xfrm>
+          <a:prstGeom prst="line">
+            <a:avLst/>
+          </a:prstGeom>
+        </p:spPr>
+        <p:style>
+          <a:lnRef idx="1">
+            <a:schemeClr val="accent1"/>
+          </a:lnRef>
+          <a:fillRef idx="0">
+            <a:schemeClr val="accent1"/>
+          </a:fillRef>
+          <a:effectRef idx="0">
+            <a:schemeClr val="accent1"/>
+          </a:effectRef>
+          <a:fontRef idx="minor">
+            <a:schemeClr val="tx1"/>
+          </a:fontRef>
+        </p:style>
+      </p:cxnSp>
+      <p:sp>
+        <p:nvSpPr>
+          <p:cNvPr id="33" name="TextBox 32">
+            <a:extLst>
+              <a:ext uri="{FF2B5EF4-FFF2-40B4-BE49-F238E27FC236}">
+                <a16:creationId xmlns:a16="http://schemas.microsoft.com/office/drawing/2014/main" id="{7D1F823B-1AC6-E648-94F6-8599E2A6471C}"/>
+              </a:ext>
+            </a:extLst>
+          </p:cNvPr>
+          <p:cNvSpPr txBox="1"/>
+          <p:nvPr/>
+        </p:nvSpPr>
+        <p:spPr>
+          <a:xfrm>
+            <a:off x="1275347" y="1949116"/>
+            <a:ext cx="937244" cy="369332"/>
+          </a:xfrm>
+          <a:prstGeom prst="rect">
+            <a:avLst/>
+          </a:prstGeom>
+          <a:noFill/>
+        </p:spPr>
+        <p:txBody>
+          <a:bodyPr wrap="square" rtlCol="0">
+            <a:spAutoFit/>
+          </a:bodyPr>
+          <a:lstStyle/>
+          <a:p>
+            <a:r>
+              <a:rPr lang="en-US" dirty="0">
+                <a:solidFill>
+                  <a:schemeClr val="accent1">
+                    <a:lumMod val="75000"/>
+                  </a:schemeClr>
+                </a:solidFill>
+              </a:rPr>
+              <a:t>Bob</a:t>
+            </a:r>
+          </a:p>
+        </p:txBody>
+      </p:sp>
+      <p:sp>
+        <p:nvSpPr>
+          <p:cNvPr id="34" name="TextBox 33">
+            <a:extLst>
+              <a:ext uri="{FF2B5EF4-FFF2-40B4-BE49-F238E27FC236}">
+                <a16:creationId xmlns:a16="http://schemas.microsoft.com/office/drawing/2014/main" id="{2434CABA-F0E9-114E-9F7A-6EC27990B974}"/>
+              </a:ext>
+            </a:extLst>
+          </p:cNvPr>
+          <p:cNvSpPr txBox="1"/>
+          <p:nvPr/>
+        </p:nvSpPr>
+        <p:spPr>
+          <a:xfrm>
+            <a:off x="1257573" y="2626380"/>
+            <a:ext cx="937244" cy="369332"/>
+          </a:xfrm>
+          <a:prstGeom prst="rect">
+            <a:avLst/>
+          </a:prstGeom>
+          <a:noFill/>
+        </p:spPr>
+        <p:txBody>
+          <a:bodyPr wrap="square" rtlCol="0">
+            <a:spAutoFit/>
+          </a:bodyPr>
+          <a:lstStyle/>
+          <a:p>
+            <a:r>
+              <a:rPr lang="en-US" dirty="0">
+                <a:solidFill>
+                  <a:schemeClr val="accent1">
+                    <a:lumMod val="75000"/>
+                  </a:schemeClr>
+                </a:solidFill>
+              </a:rPr>
+              <a:t>Amy</a:t>
+            </a:r>
+          </a:p>
+        </p:txBody>
+      </p:sp>
+      <p:sp>
+        <p:nvSpPr>
+          <p:cNvPr id="35" name="TextBox 34">
+            <a:extLst>
+              <a:ext uri="{FF2B5EF4-FFF2-40B4-BE49-F238E27FC236}">
+                <a16:creationId xmlns:a16="http://schemas.microsoft.com/office/drawing/2014/main" id="{E3609244-E3DA-524E-97B8-3EBFCD7AEDBE}"/>
+              </a:ext>
+            </a:extLst>
+          </p:cNvPr>
+          <p:cNvSpPr txBox="1"/>
+          <p:nvPr/>
+        </p:nvSpPr>
+        <p:spPr>
+          <a:xfrm>
+            <a:off x="1275347" y="3296653"/>
+            <a:ext cx="937244" cy="369332"/>
+          </a:xfrm>
+          <a:prstGeom prst="rect">
+            <a:avLst/>
+          </a:prstGeom>
+          <a:noFill/>
+        </p:spPr>
+        <p:txBody>
+          <a:bodyPr wrap="square" rtlCol="0">
+            <a:spAutoFit/>
+          </a:bodyPr>
+          <a:lstStyle/>
+          <a:p>
+            <a:r>
+              <a:rPr lang="en-US" dirty="0">
+                <a:solidFill>
+                  <a:schemeClr val="accent1">
+                    <a:lumMod val="75000"/>
+                  </a:schemeClr>
+                </a:solidFill>
+              </a:rPr>
+              <a:t>Josh</a:t>
+            </a:r>
+          </a:p>
+        </p:txBody>
+      </p:sp>
+      <p:sp>
+        <p:nvSpPr>
+          <p:cNvPr id="36" name="TextBox 35">
+            <a:extLst>
+              <a:ext uri="{FF2B5EF4-FFF2-40B4-BE49-F238E27FC236}">
+                <a16:creationId xmlns:a16="http://schemas.microsoft.com/office/drawing/2014/main" id="{77A6D70A-32F9-FA4C-87DD-7DE394FA0BEA}"/>
+              </a:ext>
+            </a:extLst>
+          </p:cNvPr>
+          <p:cNvSpPr txBox="1"/>
+          <p:nvPr/>
+        </p:nvSpPr>
+        <p:spPr>
+          <a:xfrm>
+            <a:off x="1275347" y="4018547"/>
+            <a:ext cx="937244" cy="369332"/>
+          </a:xfrm>
+          <a:prstGeom prst="rect">
+            <a:avLst/>
+          </a:prstGeom>
+          <a:noFill/>
+        </p:spPr>
+        <p:txBody>
+          <a:bodyPr wrap="square" rtlCol="0">
+            <a:spAutoFit/>
+          </a:bodyPr>
+          <a:lstStyle/>
+          <a:p>
+            <a:r>
+              <a:rPr lang="en-US" dirty="0">
+                <a:solidFill>
+                  <a:schemeClr val="accent1">
+                    <a:lumMod val="75000"/>
+                  </a:schemeClr>
+                </a:solidFill>
+              </a:rPr>
+              <a:t>Anna</a:t>
+            </a:r>
+          </a:p>
+        </p:txBody>
+      </p:sp>
+      <p:sp>
+        <p:nvSpPr>
+          <p:cNvPr id="37" name="TextBox 36">
+            <a:extLst>
+              <a:ext uri="{FF2B5EF4-FFF2-40B4-BE49-F238E27FC236}">
+                <a16:creationId xmlns:a16="http://schemas.microsoft.com/office/drawing/2014/main" id="{89E848AE-101B-BD4A-89FB-B9D08DC2D67A}"/>
+              </a:ext>
+            </a:extLst>
+          </p:cNvPr>
+          <p:cNvSpPr txBox="1"/>
+          <p:nvPr/>
+        </p:nvSpPr>
+        <p:spPr>
+          <a:xfrm>
+            <a:off x="2352959" y="2598278"/>
+            <a:ext cx="3390983" cy="369332"/>
+          </a:xfrm>
+          <a:prstGeom prst="rect">
+            <a:avLst/>
+          </a:prstGeom>
+          <a:noFill/>
+        </p:spPr>
+        <p:txBody>
+          <a:bodyPr wrap="square" rtlCol="0">
+            <a:spAutoFit/>
+          </a:bodyPr>
+          <a:lstStyle/>
+          <a:p>
+            <a:r>
+              <a:rPr lang="en-US" dirty="0">
+                <a:solidFill>
+                  <a:schemeClr val="tx2">
+                    <a:lumMod val="10000"/>
+                  </a:schemeClr>
+                </a:solidFill>
+              </a:rPr>
+              <a:t>Last active 2 hours ago</a:t>
+            </a:r>
+          </a:p>
+        </p:txBody>
+      </p:sp>
+      <p:sp>
+        <p:nvSpPr>
+          <p:cNvPr id="38" name="TextBox 37">
+            <a:extLst>
+              <a:ext uri="{FF2B5EF4-FFF2-40B4-BE49-F238E27FC236}">
+                <a16:creationId xmlns:a16="http://schemas.microsoft.com/office/drawing/2014/main" id="{8D0A846C-B138-FC46-892B-8BC161144B3C}"/>
+              </a:ext>
+            </a:extLst>
+          </p:cNvPr>
+          <p:cNvSpPr txBox="1"/>
+          <p:nvPr/>
+        </p:nvSpPr>
+        <p:spPr>
+          <a:xfrm>
+            <a:off x="2352960" y="1968774"/>
+            <a:ext cx="3585246" cy="369332"/>
+          </a:xfrm>
+          <a:prstGeom prst="rect">
+            <a:avLst/>
+          </a:prstGeom>
+          <a:noFill/>
+        </p:spPr>
+        <p:txBody>
+          <a:bodyPr wrap="square" rtlCol="0">
+            <a:spAutoFit/>
+          </a:bodyPr>
+          <a:lstStyle/>
+          <a:p>
+            <a:r>
+              <a:rPr lang="en-US" dirty="0">
+                <a:solidFill>
+                  <a:schemeClr val="tx2">
+                    <a:lumMod val="10000"/>
+                  </a:schemeClr>
+                </a:solidFill>
+              </a:rPr>
+              <a:t>Active now: one new message</a:t>
+            </a:r>
+          </a:p>
+        </p:txBody>
+      </p:sp>
+      <p:sp>
+        <p:nvSpPr>
+          <p:cNvPr id="39" name="TextBox 38">
+            <a:extLst>
+              <a:ext uri="{FF2B5EF4-FFF2-40B4-BE49-F238E27FC236}">
+                <a16:creationId xmlns:a16="http://schemas.microsoft.com/office/drawing/2014/main" id="{0CC75971-302B-824A-B64B-97BA53A85B2F}"/>
+              </a:ext>
+            </a:extLst>
+          </p:cNvPr>
+          <p:cNvSpPr txBox="1"/>
+          <p:nvPr/>
+        </p:nvSpPr>
+        <p:spPr>
+          <a:xfrm>
+            <a:off x="2352958" y="3278996"/>
+            <a:ext cx="3390983" cy="369332"/>
+          </a:xfrm>
+          <a:prstGeom prst="rect">
+            <a:avLst/>
+          </a:prstGeom>
+          <a:noFill/>
+        </p:spPr>
+        <p:txBody>
+          <a:bodyPr wrap="square" rtlCol="0">
+            <a:spAutoFit/>
+          </a:bodyPr>
+          <a:lstStyle/>
+          <a:p>
+            <a:r>
+              <a:rPr lang="en-US" dirty="0">
+                <a:solidFill>
+                  <a:schemeClr val="tx2">
+                    <a:lumMod val="10000"/>
+                  </a:schemeClr>
+                </a:solidFill>
+              </a:rPr>
+              <a:t>Last active 4 hours ago</a:t>
+            </a:r>
+          </a:p>
+        </p:txBody>
+      </p:sp>
+      <p:sp>
+        <p:nvSpPr>
+          <p:cNvPr id="40" name="TextBox 39">
+            <a:extLst>
+              <a:ext uri="{FF2B5EF4-FFF2-40B4-BE49-F238E27FC236}">
+                <a16:creationId xmlns:a16="http://schemas.microsoft.com/office/drawing/2014/main" id="{71B84212-7603-184B-BB4C-2730DAB3B391}"/>
+              </a:ext>
+            </a:extLst>
+          </p:cNvPr>
+          <p:cNvSpPr txBox="1"/>
+          <p:nvPr/>
+        </p:nvSpPr>
+        <p:spPr>
+          <a:xfrm>
+            <a:off x="2352958" y="3960388"/>
+            <a:ext cx="3390983" cy="369332"/>
+          </a:xfrm>
+          <a:prstGeom prst="rect">
+            <a:avLst/>
+          </a:prstGeom>
+          <a:noFill/>
+        </p:spPr>
+        <p:txBody>
+          <a:bodyPr wrap="square" rtlCol="0">
+            <a:spAutoFit/>
+          </a:bodyPr>
+          <a:lstStyle/>
+          <a:p>
+            <a:r>
+              <a:rPr lang="en-US" dirty="0">
+                <a:solidFill>
+                  <a:schemeClr val="tx2">
+                    <a:lumMod val="10000"/>
+                  </a:schemeClr>
+                </a:solidFill>
+              </a:rPr>
+              <a:t>Last active yesterday</a:t>
+            </a:r>
+          </a:p>
+        </p:txBody>
+      </p:sp>
+      <p:sp>
+        <p:nvSpPr>
+          <p:cNvPr id="42" name="Lightning Bolt 41">
+            <a:extLst>
+              <a:ext uri="{FF2B5EF4-FFF2-40B4-BE49-F238E27FC236}">
+                <a16:creationId xmlns:a16="http://schemas.microsoft.com/office/drawing/2014/main" id="{12D5E3DD-1951-BE4B-A971-46E560455667}"/>
+              </a:ext>
+            </a:extLst>
+          </p:cNvPr>
+          <p:cNvSpPr/>
+          <p:nvPr/>
+        </p:nvSpPr>
+        <p:spPr>
+          <a:xfrm rot="249055">
+            <a:off x="1053791" y="2016868"/>
+            <a:ext cx="235933" cy="251834"/>
+          </a:xfrm>
+          <a:prstGeom prst="lightningBolt">
+            <a:avLst/>
+          </a:prstGeom>
+        </p:spPr>
+        <p:style>
+          <a:lnRef idx="2">
+            <a:schemeClr val="accent1">
+              <a:shade val="50000"/>
+            </a:schemeClr>
+          </a:lnRef>
+          <a:fillRef idx="1">
+            <a:schemeClr val="accent1"/>
+          </a:fillRef>
+          <a:effectRef idx="0">
+            <a:schemeClr val="accent1"/>
+          </a:effectRef>
+          <a:fontRef idx="minor">
+            <a:schemeClr val="lt1"/>
+          </a:fontRef>
+        </p:style>
+        <p:txBody>
+          <a:bodyPr rtlCol="0" anchor="ctr"/>
+          <a:lstStyle/>
+          <a:p>
+            <a:pPr algn="ctr"/>
+            <a:endParaRPr lang="en-US"/>
+          </a:p>
+        </p:txBody>
+      </p:sp>
     </p:spTree>
     <p:extLst>
       <p:ext uri="{BB962C8B-B14F-4D97-AF65-F5344CB8AC3E}">

</xml_diff>

<commit_message>
Modified powerpoint prototype to add links to images
</commit_message>
<xml_diff>
--- a/High Fidelity Prototyping Group 19.pptx
+++ b/High Fidelity Prototyping Group 19.pptx
@@ -395,7 +395,7 @@
           <a:p>
             <a:fld id="{57398CF1-2A2E-404A-9DC0-DB6C4A39A2F6}" type="datetimeFigureOut">
               <a:rPr lang="en-US" smtClean="0"/>
-              <a:t>4/5/2020</a:t>
+              <a:t>4/26/2020</a:t>
             </a:fld>
             <a:endParaRPr lang="en-US"/>
           </a:p>
@@ -809,7 +809,7 @@
           <a:p>
             <a:fld id="{57398CF1-2A2E-404A-9DC0-DB6C4A39A2F6}" type="datetimeFigureOut">
               <a:rPr lang="en-US" smtClean="0"/>
-              <a:t>4/5/2020</a:t>
+              <a:t>4/26/2020</a:t>
             </a:fld>
             <a:endParaRPr lang="en-US"/>
           </a:p>
@@ -1145,7 +1145,7 @@
           <a:p>
             <a:fld id="{57398CF1-2A2E-404A-9DC0-DB6C4A39A2F6}" type="datetimeFigureOut">
               <a:rPr lang="en-US" smtClean="0"/>
-              <a:t>4/5/2020</a:t>
+              <a:t>4/26/2020</a:t>
             </a:fld>
             <a:endParaRPr lang="en-US"/>
           </a:p>
@@ -1550,7 +1550,7 @@
           <a:p>
             <a:fld id="{57398CF1-2A2E-404A-9DC0-DB6C4A39A2F6}" type="datetimeFigureOut">
               <a:rPr lang="en-US" smtClean="0"/>
-              <a:t>4/5/2020</a:t>
+              <a:t>4/26/2020</a:t>
             </a:fld>
             <a:endParaRPr lang="en-US"/>
           </a:p>
@@ -2118,7 +2118,7 @@
           <a:p>
             <a:fld id="{57398CF1-2A2E-404A-9DC0-DB6C4A39A2F6}" type="datetimeFigureOut">
               <a:rPr lang="en-US" smtClean="0"/>
-              <a:t>4/5/2020</a:t>
+              <a:t>4/26/2020</a:t>
             </a:fld>
             <a:endParaRPr lang="en-US"/>
           </a:p>
@@ -2799,7 +2799,7 @@
           <a:p>
             <a:fld id="{57398CF1-2A2E-404A-9DC0-DB6C4A39A2F6}" type="datetimeFigureOut">
               <a:rPr lang="en-US" smtClean="0"/>
-              <a:t>4/5/2020</a:t>
+              <a:t>4/26/2020</a:t>
             </a:fld>
             <a:endParaRPr lang="en-US"/>
           </a:p>
@@ -3712,7 +3712,7 @@
           <a:p>
             <a:fld id="{57398CF1-2A2E-404A-9DC0-DB6C4A39A2F6}" type="datetimeFigureOut">
               <a:rPr lang="en-US" smtClean="0"/>
-              <a:t>4/5/2020</a:t>
+              <a:t>4/26/2020</a:t>
             </a:fld>
             <a:endParaRPr lang="en-US"/>
           </a:p>
@@ -4025,7 +4025,7 @@
           <a:p>
             <a:fld id="{57398CF1-2A2E-404A-9DC0-DB6C4A39A2F6}" type="datetimeFigureOut">
               <a:rPr lang="en-US" smtClean="0"/>
-              <a:t>4/5/2020</a:t>
+              <a:t>4/26/2020</a:t>
             </a:fld>
             <a:endParaRPr lang="en-US"/>
           </a:p>
@@ -4289,7 +4289,7 @@
           <a:p>
             <a:fld id="{57398CF1-2A2E-404A-9DC0-DB6C4A39A2F6}" type="datetimeFigureOut">
               <a:rPr lang="en-US" smtClean="0"/>
-              <a:t>4/5/2020</a:t>
+              <a:t>4/26/2020</a:t>
             </a:fld>
             <a:endParaRPr lang="en-US"/>
           </a:p>
@@ -4612,7 +4612,7 @@
           <a:p>
             <a:fld id="{57398CF1-2A2E-404A-9DC0-DB6C4A39A2F6}" type="datetimeFigureOut">
               <a:rPr lang="en-US" smtClean="0"/>
-              <a:t>4/5/2020</a:t>
+              <a:t>4/26/2020</a:t>
             </a:fld>
             <a:endParaRPr lang="en-US"/>
           </a:p>
@@ -5001,7 +5001,7 @@
           <a:p>
             <a:fld id="{57398CF1-2A2E-404A-9DC0-DB6C4A39A2F6}" type="datetimeFigureOut">
               <a:rPr lang="en-US" smtClean="0"/>
-              <a:t>4/5/2020</a:t>
+              <a:t>4/26/2020</a:t>
             </a:fld>
             <a:endParaRPr lang="en-US"/>
           </a:p>
@@ -5377,7 +5377,7 @@
           <a:p>
             <a:fld id="{57398CF1-2A2E-404A-9DC0-DB6C4A39A2F6}" type="datetimeFigureOut">
               <a:rPr lang="en-US" smtClean="0"/>
-              <a:t>4/5/2020</a:t>
+              <a:t>4/26/2020</a:t>
             </a:fld>
             <a:endParaRPr lang="en-US"/>
           </a:p>
@@ -5883,7 +5883,7 @@
           <a:p>
             <a:fld id="{57398CF1-2A2E-404A-9DC0-DB6C4A39A2F6}" type="datetimeFigureOut">
               <a:rPr lang="en-US" smtClean="0"/>
-              <a:t>4/5/2020</a:t>
+              <a:t>4/26/2020</a:t>
             </a:fld>
             <a:endParaRPr lang="en-US"/>
           </a:p>
@@ -6140,7 +6140,7 @@
           <a:p>
             <a:fld id="{57398CF1-2A2E-404A-9DC0-DB6C4A39A2F6}" type="datetimeFigureOut">
               <a:rPr lang="en-US" smtClean="0"/>
-              <a:t>4/5/2020</a:t>
+              <a:t>4/26/2020</a:t>
             </a:fld>
             <a:endParaRPr lang="en-US"/>
           </a:p>
@@ -6303,7 +6303,7 @@
           <a:p>
             <a:fld id="{57398CF1-2A2E-404A-9DC0-DB6C4A39A2F6}" type="datetimeFigureOut">
               <a:rPr lang="en-US" smtClean="0"/>
-              <a:t>4/5/2020</a:t>
+              <a:t>4/26/2020</a:t>
             </a:fld>
             <a:endParaRPr lang="en-US"/>
           </a:p>
@@ -6693,7 +6693,7 @@
           <a:p>
             <a:fld id="{57398CF1-2A2E-404A-9DC0-DB6C4A39A2F6}" type="datetimeFigureOut">
               <a:rPr lang="en-US" smtClean="0"/>
-              <a:t>4/5/2020</a:t>
+              <a:t>4/26/2020</a:t>
             </a:fld>
             <a:endParaRPr lang="en-US"/>
           </a:p>
@@ -7102,7 +7102,7 @@
           <a:p>
             <a:fld id="{57398CF1-2A2E-404A-9DC0-DB6C4A39A2F6}" type="datetimeFigureOut">
               <a:rPr lang="en-US" smtClean="0"/>
-              <a:t>4/5/2020</a:t>
+              <a:t>4/26/2020</a:t>
             </a:fld>
             <a:endParaRPr lang="en-US"/>
           </a:p>
@@ -7346,7 +7346,7 @@
           <a:p>
             <a:fld id="{57398CF1-2A2E-404A-9DC0-DB6C4A39A2F6}" type="datetimeFigureOut">
               <a:rPr lang="en-US" smtClean="0"/>
-              <a:t>4/5/2020</a:t>
+              <a:t>4/26/2020</a:t>
             </a:fld>
             <a:endParaRPr lang="en-US"/>
           </a:p>
@@ -8683,6 +8683,7 @@
       <p:pic>
         <p:nvPicPr>
           <p:cNvPr id="3" name="Picture 2">
+            <a:hlinkClick r:id="rId5" action="ppaction://hlinksldjump"/>
             <a:extLst>
               <a:ext uri="{FF2B5EF4-FFF2-40B4-BE49-F238E27FC236}">
                 <a16:creationId xmlns:a16="http://schemas.microsoft.com/office/drawing/2014/main" id="{0088BF91-BDCE-DD44-B2B5-ABD70311857F}"/>
@@ -8920,6 +8921,7 @@
       <p:pic>
         <p:nvPicPr>
           <p:cNvPr id="19" name="Picture 18">
+            <a:hlinkClick r:id="rId6" action="ppaction://hlinksldjump"/>
             <a:extLst>
               <a:ext uri="{FF2B5EF4-FFF2-40B4-BE49-F238E27FC236}">
                 <a16:creationId xmlns:a16="http://schemas.microsoft.com/office/drawing/2014/main" id="{41C3A364-4839-BC4E-829C-0E18170ADED1}"/>
@@ -8950,6 +8952,7 @@
       <p:pic>
         <p:nvPicPr>
           <p:cNvPr id="21" name="Picture 20">
+            <a:hlinkClick r:id="rId7" action="ppaction://hlinksldjump"/>
             <a:extLst>
               <a:ext uri="{FF2B5EF4-FFF2-40B4-BE49-F238E27FC236}">
                 <a16:creationId xmlns:a16="http://schemas.microsoft.com/office/drawing/2014/main" id="{8B8797CC-1A7A-5749-B4D7-F8BA15E96164}"/>

</xml_diff>